<commit_message>
update imgs, add plot.py, tmp.py
</commit_message>
<xml_diff>
--- a/final-project/img/簡報1.pptx
+++ b/final-project/img/簡報1.pptx
@@ -3148,15 +3148,15 @@
           </p:nvGrpSpPr>
           <p:grpSpPr>
             <a:xfrm>
-              <a:off x="-2383862" y="121747"/>
-              <a:ext cx="22030860" cy="6746538"/>
-              <a:chOff x="-867366" y="1374199"/>
-              <a:chExt cx="13920076" cy="4114288"/>
+              <a:off x="-2383862" y="146769"/>
+              <a:ext cx="22030860" cy="6696496"/>
+              <a:chOff x="-867366" y="1389458"/>
+              <a:chExt cx="13920076" cy="4083770"/>
             </a:xfrm>
           </p:grpSpPr>
           <p:pic>
             <p:nvPicPr>
-              <p:cNvPr id="11" name="圖片 10" descr="一張含有 字型, 行, 圖表, 數字 的圖片&#10;&#10;AI 產生的內容可能不正確。">
+              <p:cNvPr id="11" name="圖片 10">
                 <a:extLst>
                   <a:ext uri="{FF2B5EF4-FFF2-40B4-BE49-F238E27FC236}">
                     <a16:creationId xmlns:a16="http://schemas.microsoft.com/office/drawing/2014/main" id="{F6B61983-99B5-4E0C-990D-D4129DD9826E}"/>
@@ -3176,14 +3176,13 @@
                   </a:ext>
                 </a:extLst>
               </a:blip>
-              <a:stretch>
-                <a:fillRect/>
-              </a:stretch>
+              <a:srcRect/>
+              <a:stretch/>
             </p:blipFill>
             <p:spPr>
               <a:xfrm>
-                <a:off x="3496320" y="1374199"/>
-                <a:ext cx="3682782" cy="1814211"/>
+                <a:off x="3496320" y="1389458"/>
+                <a:ext cx="3682782" cy="1783693"/>
               </a:xfrm>
               <a:prstGeom prst="rect">
                 <a:avLst/>
@@ -3197,7 +3196,7 @@
           </p:pic>
           <p:pic>
             <p:nvPicPr>
-              <p:cNvPr id="13" name="圖片 12" descr="一張含有 字型, 圖形, 行, 符號 的圖片&#10;&#10;AI 產生的內容可能不正確。">
+              <p:cNvPr id="13" name="圖片 12">
                 <a:extLst>
                   <a:ext uri="{FF2B5EF4-FFF2-40B4-BE49-F238E27FC236}">
                     <a16:creationId xmlns:a16="http://schemas.microsoft.com/office/drawing/2014/main" id="{58A72624-8317-DBB1-5421-308B863C599E}"/>
@@ -3217,14 +3216,13 @@
                   </a:ext>
                 </a:extLst>
               </a:blip>
-              <a:stretch>
-                <a:fillRect/>
-              </a:stretch>
+              <a:srcRect/>
+              <a:stretch/>
             </p:blipFill>
             <p:spPr>
               <a:xfrm>
-                <a:off x="5037380" y="3670569"/>
-                <a:ext cx="3682782" cy="1814211"/>
+                <a:off x="5037380" y="3685827"/>
+                <a:ext cx="3682782" cy="1783693"/>
               </a:xfrm>
               <a:prstGeom prst="rect">
                 <a:avLst/>
@@ -3238,7 +3236,7 @@
           </p:pic>
           <p:pic>
             <p:nvPicPr>
-              <p:cNvPr id="15" name="圖片 14" descr="一張含有 字型, 圖形, 行, 電子藍 的圖片&#10;&#10;AI 產生的內容可能不正確。">
+              <p:cNvPr id="15" name="圖片 14">
                 <a:extLst>
                   <a:ext uri="{FF2B5EF4-FFF2-40B4-BE49-F238E27FC236}">
                     <a16:creationId xmlns:a16="http://schemas.microsoft.com/office/drawing/2014/main" id="{74FD9F34-6CF2-8412-CCEA-08EAC6FEB1DA}"/>
@@ -3258,14 +3256,13 @@
                   </a:ext>
                 </a:extLst>
               </a:blip>
-              <a:stretch>
-                <a:fillRect/>
-              </a:stretch>
+              <a:srcRect/>
+              <a:stretch/>
             </p:blipFill>
             <p:spPr>
               <a:xfrm>
-                <a:off x="9369928" y="3674276"/>
-                <a:ext cx="3682782" cy="1814211"/>
+                <a:off x="9369928" y="3689535"/>
+                <a:ext cx="3682782" cy="1783693"/>
               </a:xfrm>
               <a:prstGeom prst="rect">
                 <a:avLst/>
@@ -3279,7 +3276,7 @@
           </p:pic>
           <p:pic>
             <p:nvPicPr>
-              <p:cNvPr id="17" name="圖片 16" descr="一張含有 字型, 白色, 圖形, 印刷術 的圖片&#10;&#10;AI 產生的內容可能不正確。">
+              <p:cNvPr id="17" name="圖片 16">
                 <a:extLst>
                   <a:ext uri="{FF2B5EF4-FFF2-40B4-BE49-F238E27FC236}">
                     <a16:creationId xmlns:a16="http://schemas.microsoft.com/office/drawing/2014/main" id="{310629EC-7C4B-2FB8-C53E-CF795CC81602}"/>
@@ -3299,14 +3296,13 @@
                   </a:ext>
                 </a:extLst>
               </a:blip>
-              <a:stretch>
-                <a:fillRect/>
-              </a:stretch>
+              <a:srcRect/>
+              <a:stretch/>
             </p:blipFill>
             <p:spPr>
               <a:xfrm>
-                <a:off x="-867366" y="1374199"/>
-                <a:ext cx="3682782" cy="1814212"/>
+                <a:off x="-867366" y="1389458"/>
+                <a:ext cx="3682782" cy="1783693"/>
               </a:xfrm>
               <a:prstGeom prst="rect">
                 <a:avLst/>

</xml_diff>